<commit_message>
a couple of minor fixes i found while writing the code examples
</commit_message>
<xml_diff>
--- a/lesson_3/Lesson3 - variables and conditions take 2.pptx
+++ b/lesson_3/Lesson3 - variables and conditions take 2.pptx
@@ -207,7 +207,7 @@
           <a:p>
             <a:fld id="{D063134C-E624-479D-8AE6-639B201674F1}" type="datetimeFigureOut">
               <a:rPr lang="en-US" smtClean="0"/>
-              <a:t>1/17/2016</a:t>
+              <a:t>1/18/2016</a:t>
             </a:fld>
             <a:endParaRPr lang="en-US"/>
           </a:p>
@@ -1558,7 +1558,7 @@
           <a:p>
             <a:fld id="{1F490A8C-D7C9-41CF-84E6-06D12254D666}" type="datetimeFigureOut">
               <a:rPr lang="en-US" smtClean="0"/>
-              <a:t>1/17/2016</a:t>
+              <a:t>1/18/2016</a:t>
             </a:fld>
             <a:endParaRPr lang="en-US"/>
           </a:p>
@@ -1833,7 +1833,7 @@
           <a:p>
             <a:fld id="{1F490A8C-D7C9-41CF-84E6-06D12254D666}" type="datetimeFigureOut">
               <a:rPr lang="en-US" smtClean="0"/>
-              <a:t>1/17/2016</a:t>
+              <a:t>1/18/2016</a:t>
             </a:fld>
             <a:endParaRPr lang="en-US"/>
           </a:p>
@@ -2027,7 +2027,7 @@
           <a:p>
             <a:fld id="{1F490A8C-D7C9-41CF-84E6-06D12254D666}" type="datetimeFigureOut">
               <a:rPr lang="en-US" smtClean="0"/>
-              <a:t>1/17/2016</a:t>
+              <a:t>1/18/2016</a:t>
             </a:fld>
             <a:endParaRPr lang="en-US"/>
           </a:p>
@@ -2300,7 +2300,7 @@
           <a:p>
             <a:fld id="{1F490A8C-D7C9-41CF-84E6-06D12254D666}" type="datetimeFigureOut">
               <a:rPr lang="en-US" smtClean="0"/>
-              <a:t>1/17/2016</a:t>
+              <a:t>1/18/2016</a:t>
             </a:fld>
             <a:endParaRPr lang="en-US"/>
           </a:p>
@@ -2641,7 +2641,7 @@
           <a:p>
             <a:fld id="{1F490A8C-D7C9-41CF-84E6-06D12254D666}" type="datetimeFigureOut">
               <a:rPr lang="en-US" smtClean="0"/>
-              <a:t>1/17/2016</a:t>
+              <a:t>1/18/2016</a:t>
             </a:fld>
             <a:endParaRPr lang="en-US"/>
           </a:p>
@@ -3264,7 +3264,7 @@
           <a:p>
             <a:fld id="{1F490A8C-D7C9-41CF-84E6-06D12254D666}" type="datetimeFigureOut">
               <a:rPr lang="en-US" smtClean="0"/>
-              <a:t>1/17/2016</a:t>
+              <a:t>1/18/2016</a:t>
             </a:fld>
             <a:endParaRPr lang="en-US"/>
           </a:p>
@@ -4124,7 +4124,7 @@
           <a:p>
             <a:fld id="{1F490A8C-D7C9-41CF-84E6-06D12254D666}" type="datetimeFigureOut">
               <a:rPr lang="en-US" smtClean="0"/>
-              <a:t>1/17/2016</a:t>
+              <a:t>1/18/2016</a:t>
             </a:fld>
             <a:endParaRPr lang="en-US"/>
           </a:p>
@@ -4294,7 +4294,7 @@
           <a:p>
             <a:fld id="{1F490A8C-D7C9-41CF-84E6-06D12254D666}" type="datetimeFigureOut">
               <a:rPr lang="en-US" smtClean="0"/>
-              <a:t>1/17/2016</a:t>
+              <a:t>1/18/2016</a:t>
             </a:fld>
             <a:endParaRPr lang="en-US"/>
           </a:p>
@@ -4474,7 +4474,7 @@
           <a:p>
             <a:fld id="{1F490A8C-D7C9-41CF-84E6-06D12254D666}" type="datetimeFigureOut">
               <a:rPr lang="en-US" smtClean="0"/>
-              <a:t>1/17/2016</a:t>
+              <a:t>1/18/2016</a:t>
             </a:fld>
             <a:endParaRPr lang="en-US"/>
           </a:p>
@@ -4644,7 +4644,7 @@
           <a:p>
             <a:fld id="{1F490A8C-D7C9-41CF-84E6-06D12254D666}" type="datetimeFigureOut">
               <a:rPr lang="en-US" smtClean="0"/>
-              <a:t>1/17/2016</a:t>
+              <a:t>1/18/2016</a:t>
             </a:fld>
             <a:endParaRPr lang="en-US"/>
           </a:p>
@@ -4891,7 +4891,7 @@
           <a:p>
             <a:fld id="{1F490A8C-D7C9-41CF-84E6-06D12254D666}" type="datetimeFigureOut">
               <a:rPr lang="en-US" smtClean="0"/>
-              <a:t>1/17/2016</a:t>
+              <a:t>1/18/2016</a:t>
             </a:fld>
             <a:endParaRPr lang="en-US"/>
           </a:p>
@@ -5183,7 +5183,7 @@
           <a:p>
             <a:fld id="{1F490A8C-D7C9-41CF-84E6-06D12254D666}" type="datetimeFigureOut">
               <a:rPr lang="en-US" smtClean="0"/>
-              <a:t>1/17/2016</a:t>
+              <a:t>1/18/2016</a:t>
             </a:fld>
             <a:endParaRPr lang="en-US"/>
           </a:p>
@@ -5627,7 +5627,7 @@
           <a:p>
             <a:fld id="{1F490A8C-D7C9-41CF-84E6-06D12254D666}" type="datetimeFigureOut">
               <a:rPr lang="en-US" smtClean="0"/>
-              <a:t>1/17/2016</a:t>
+              <a:t>1/18/2016</a:t>
             </a:fld>
             <a:endParaRPr lang="en-US"/>
           </a:p>
@@ -5745,7 +5745,7 @@
           <a:p>
             <a:fld id="{1F490A8C-D7C9-41CF-84E6-06D12254D666}" type="datetimeFigureOut">
               <a:rPr lang="en-US" smtClean="0"/>
-              <a:t>1/17/2016</a:t>
+              <a:t>1/18/2016</a:t>
             </a:fld>
             <a:endParaRPr lang="en-US"/>
           </a:p>
@@ -5840,7 +5840,7 @@
           <a:p>
             <a:fld id="{1F490A8C-D7C9-41CF-84E6-06D12254D666}" type="datetimeFigureOut">
               <a:rPr lang="en-US" smtClean="0"/>
-              <a:t>1/17/2016</a:t>
+              <a:t>1/18/2016</a:t>
             </a:fld>
             <a:endParaRPr lang="en-US"/>
           </a:p>
@@ -6119,7 +6119,7 @@
           <a:p>
             <a:fld id="{1F490A8C-D7C9-41CF-84E6-06D12254D666}" type="datetimeFigureOut">
               <a:rPr lang="en-US" smtClean="0"/>
-              <a:t>1/17/2016</a:t>
+              <a:t>1/18/2016</a:t>
             </a:fld>
             <a:endParaRPr lang="en-US"/>
           </a:p>
@@ -6394,7 +6394,7 @@
           <a:p>
             <a:fld id="{1F490A8C-D7C9-41CF-84E6-06D12254D666}" type="datetimeFigureOut">
               <a:rPr lang="en-US" smtClean="0"/>
-              <a:t>1/17/2016</a:t>
+              <a:t>1/18/2016</a:t>
             </a:fld>
             <a:endParaRPr lang="en-US"/>
           </a:p>
@@ -6823,7 +6823,7 @@
           <a:p>
             <a:fld id="{1F490A8C-D7C9-41CF-84E6-06D12254D666}" type="datetimeFigureOut">
               <a:rPr lang="en-US" smtClean="0"/>
-              <a:t>1/17/2016</a:t>
+              <a:t>1/18/2016</a:t>
             </a:fld>
             <a:endParaRPr lang="en-US"/>
           </a:p>
@@ -7392,11 +7392,7 @@
             <a:pPr algn="l"/>
             <a:r>
               <a:rPr lang="he-IL" dirty="0" smtClean="0"/>
-              <a:t>משתנים ותנאים </a:t>
-            </a:r>
-            <a:r>
-              <a:rPr lang="he-IL" dirty="0" smtClean="0"/>
-              <a:t>(טייק 2</a:t>
+              <a:t>משתנים ותנאים (טייק 2</a:t>
             </a:r>
             <a:r>
               <a:rPr lang="he-IL" dirty="0" smtClean="0">
@@ -7455,7 +7451,7 @@
           <a:p>
             <a:r>
               <a:rPr lang="he-IL" dirty="0" smtClean="0"/>
-              <a:t>חיכיתם להתחיל לעבוד?</a:t>
+              <a:t>יאללה, לעבוד!</a:t>
             </a:r>
             <a:endParaRPr lang="en-US" dirty="0"/>
           </a:p>
@@ -7592,7 +7588,6 @@
               <a:rPr lang="he-IL" dirty="0" smtClean="0"/>
               <a:t>שימוש בערך</a:t>
             </a:r>
-            <a:endParaRPr lang="he-IL" dirty="0" smtClean="0"/>
           </a:p>
           <a:p>
             <a:pPr lvl="1" algn="r" rtl="1"/>
@@ -7611,7 +7606,6 @@
               <a:rPr lang="he-IL" dirty="0" smtClean="0"/>
               <a:t>הדרך לשאול שאלות על העולם</a:t>
             </a:r>
-            <a:endParaRPr lang="he-IL" dirty="0" smtClean="0"/>
           </a:p>
           <a:p>
             <a:pPr lvl="1" algn="r" rtl="1"/>
@@ -7626,23 +7620,13 @@
               <a:rPr lang="he-IL" dirty="0" smtClean="0"/>
               <a:t>הרכבה של שאלות</a:t>
             </a:r>
-            <a:endParaRPr lang="he-IL" dirty="0" smtClean="0"/>
           </a:p>
           <a:p>
             <a:pPr lvl="1" algn="r" rtl="1"/>
             <a:r>
               <a:rPr lang="he-IL" dirty="0" smtClean="0"/>
-              <a:t>משמש לקבל </a:t>
-            </a:r>
-            <a:r>
-              <a:rPr lang="he-IL" dirty="0" smtClean="0"/>
-              <a:t>החלטות וליצור </a:t>
-            </a:r>
-            <a:r>
-              <a:rPr lang="he-IL" dirty="0" smtClean="0"/>
-              <a:t>לולאות</a:t>
-            </a:r>
-            <a:endParaRPr lang="he-IL" dirty="0" smtClean="0"/>
+              <a:t>משמש לקבל החלטות וליצור לולאות</a:t>
+            </a:r>
           </a:p>
         </p:txBody>
       </p:sp>
@@ -7967,7 +7951,6 @@
               <a:rPr lang="he-IL" dirty="0" smtClean="0"/>
               <a:t>עכשיו אפשר לשים בו ערכים:</a:t>
             </a:r>
-            <a:endParaRPr lang="he-IL" dirty="0" smtClean="0"/>
           </a:p>
           <a:p>
             <a:pPr lvl="1" algn="r" rtl="1"/>
@@ -7975,7 +7958,6 @@
               <a:rPr lang="he-IL" dirty="0" smtClean="0"/>
               <a:t>משמאל לסימן "=" שמים את שם המשתנה שרוצים להכניס לו ערך</a:t>
             </a:r>
-            <a:endParaRPr lang="he-IL" dirty="0" smtClean="0"/>
           </a:p>
           <a:p>
             <a:pPr lvl="1" algn="r" rtl="1"/>
@@ -8125,7 +8107,6 @@
               <a:rPr lang="he-IL" dirty="0" smtClean="0"/>
               <a:t>בתנאים (נדבר על זה עוד בהמשך)</a:t>
             </a:r>
-            <a:endParaRPr lang="he-IL" dirty="0" smtClean="0"/>
           </a:p>
         </p:txBody>
       </p:sp>
@@ -8272,7 +8253,6 @@
               <a:rPr lang="he-IL" dirty="0" smtClean="0"/>
               <a:t>?</a:t>
             </a:r>
-            <a:endParaRPr lang="he-IL" dirty="0" smtClean="0"/>
           </a:p>
           <a:p>
             <a:pPr lvl="1" algn="r" rtl="1"/>
@@ -8314,11 +8294,7 @@
             </a:r>
             <a:r>
               <a:rPr lang="he-IL" dirty="0" smtClean="0"/>
-              <a:t>) - סוג </a:t>
-            </a:r>
-            <a:r>
-              <a:rPr lang="he-IL" dirty="0" smtClean="0"/>
-              <a:t>משתנה מיוחד</a:t>
+              <a:t>) - סוג משתנה מיוחד</a:t>
             </a:r>
           </a:p>
           <a:p>
@@ -8449,52 +8425,46 @@
             <a:pPr lvl="1" algn="r" rtl="1"/>
             <a:r>
               <a:rPr lang="he-IL" i="1" dirty="0" smtClean="0"/>
-              <a:t>אם </a:t>
-            </a:r>
+              <a:t>אם "נתקעתי בקיר" </a:t>
+            </a:r>
+            <a:r>
+              <a:rPr lang="he-IL" dirty="0" smtClean="0"/>
+              <a:t>= תנאי (כלומר, התשובה ל"האם נתקעתי בקיר" היא </a:t>
+            </a:r>
+            <a:r>
+              <a:rPr lang="en-US" dirty="0" smtClean="0"/>
+              <a:t>true</a:t>
+            </a:r>
+            <a:r>
+              <a:rPr lang="he-IL" dirty="0" smtClean="0"/>
+              <a:t>)</a:t>
+            </a:r>
+          </a:p>
+          <a:p>
+            <a:pPr lvl="2" algn="r" rtl="1"/>
             <a:r>
               <a:rPr lang="he-IL" i="1" dirty="0" smtClean="0"/>
-              <a:t>"נתקעתי בקיר</a:t>
-            </a:r>
-            <a:r>
-              <a:rPr lang="he-IL" i="1" dirty="0" smtClean="0"/>
-              <a:t>" = תנאי (כלומר, התשובה ל"האם נתקעתי בקיר" היא </a:t>
-            </a:r>
-            <a:r>
-              <a:rPr lang="en-US" i="1" dirty="0" smtClean="0"/>
-              <a:t>true</a:t>
-            </a:r>
-            <a:r>
-              <a:rPr lang="he-IL" i="1" dirty="0" smtClean="0"/>
+              <a:t>אז אני אסתובב אחורה </a:t>
+            </a:r>
+            <a:r>
+              <a:rPr lang="he-IL" dirty="0" smtClean="0"/>
+              <a:t>= הפקודות שבבלוק של התנאי</a:t>
+            </a:r>
+          </a:p>
+          <a:p>
+            <a:pPr lvl="1" algn="r" rtl="1"/>
+            <a:r>
+              <a:rPr lang="he-IL" dirty="0" smtClean="0"/>
+              <a:t>אפשר (לא חייבים) גם להגדיר "מה עושים אחרת" (כלומר, אם התשובה היא </a:t>
+            </a:r>
+            <a:r>
+              <a:rPr lang="en-US" dirty="0" smtClean="0"/>
+              <a:t>false</a:t>
+            </a:r>
+            <a:r>
+              <a:rPr lang="he-IL" dirty="0" smtClean="0"/>
               <a:t>)</a:t>
             </a:r>
-            <a:endParaRPr lang="he-IL" i="1" dirty="0" smtClean="0"/>
-          </a:p>
-          <a:p>
-            <a:pPr lvl="2" algn="r" rtl="1"/>
-            <a:r>
-              <a:rPr lang="he-IL" i="1" dirty="0" smtClean="0"/>
-              <a:t>אז אני אסתובב </a:t>
-            </a:r>
-            <a:r>
-              <a:rPr lang="he-IL" i="1" dirty="0" smtClean="0"/>
-              <a:t>אחורה = הפקודות שבבלוק של התנאי</a:t>
-            </a:r>
-          </a:p>
-          <a:p>
-            <a:pPr lvl="1" algn="r" rtl="1"/>
-            <a:r>
-              <a:rPr lang="he-IL" i="1" dirty="0" smtClean="0"/>
-              <a:t>אפשר (לא חייבים) גם להגדיר "מה עושים אחרת" (כלומר, אם התשובה היא </a:t>
-            </a:r>
-            <a:r>
-              <a:rPr lang="en-US" i="1" dirty="0" smtClean="0"/>
-              <a:t>false</a:t>
-            </a:r>
-            <a:r>
-              <a:rPr lang="he-IL" i="1" dirty="0" smtClean="0"/>
-              <a:t>)</a:t>
-            </a:r>
-            <a:endParaRPr lang="he-IL" i="1" dirty="0" smtClean="0"/>
           </a:p>
           <a:p>
             <a:pPr lvl="1" algn="r" rtl="1"/>
@@ -8516,51 +8486,50 @@
             <a:pPr lvl="1" algn="r" rtl="1"/>
             <a:r>
               <a:rPr lang="he-IL" i="1" dirty="0" smtClean="0"/>
-              <a:t>כל עוד "אני בתוך בניין" = תנאי הלולאה (כלומר, התשובה ל"האם אני בתוך בניין" היא </a:t>
-            </a:r>
-            <a:r>
-              <a:rPr lang="en-US" i="1" dirty="0" smtClean="0"/>
+              <a:t>כל עוד "אני בתוך בניין"</a:t>
+            </a:r>
+            <a:r>
+              <a:rPr lang="he-IL" dirty="0" smtClean="0"/>
+              <a:t> = תנאי הלולאה (כלומר, התשובה ל"האם אני בתוך בניין" היא </a:t>
+            </a:r>
+            <a:r>
+              <a:rPr lang="en-US" dirty="0" smtClean="0"/>
               <a:t>true</a:t>
             </a:r>
             <a:r>
+              <a:rPr lang="he-IL" dirty="0" smtClean="0"/>
+              <a:t>)</a:t>
+            </a:r>
+          </a:p>
+          <a:p>
+            <a:pPr lvl="2" algn="r" rtl="1"/>
+            <a:r>
               <a:rPr lang="he-IL" i="1" dirty="0" smtClean="0"/>
-              <a:t>)</a:t>
+              <a:t>אחפש את הדלת הבאה ואצא ממנה </a:t>
+            </a:r>
+            <a:r>
+              <a:rPr lang="he-IL" dirty="0" smtClean="0"/>
+              <a:t>= הפקודות שבבלוק של הלולאה</a:t>
             </a:r>
           </a:p>
           <a:p>
             <a:pPr lvl="2" algn="r" rtl="1"/>
             <a:r>
-              <a:rPr lang="he-IL" i="1" dirty="0" smtClean="0"/>
-              <a:t>אחפש </a:t>
-            </a:r>
-            <a:r>
-              <a:rPr lang="he-IL" i="1" dirty="0" smtClean="0"/>
-              <a:t>את הדלת </a:t>
-            </a:r>
-            <a:r>
-              <a:rPr lang="he-IL" i="1" dirty="0" smtClean="0"/>
-              <a:t>הבאה ואצא ממנה = הפקודות שבבלוק של הלולאה</a:t>
-            </a:r>
-            <a:endParaRPr lang="he-IL" i="1" dirty="0" smtClean="0"/>
+              <a:rPr lang="he-IL" dirty="0" smtClean="0"/>
+              <a:t>בסוף הבלוק של הלולאה, חוזרים לתנאי ובודקים אותו שוב</a:t>
+            </a:r>
           </a:p>
           <a:p>
             <a:pPr lvl="2" algn="r" rtl="1"/>
             <a:r>
-              <a:rPr lang="he-IL" i="1" dirty="0" smtClean="0"/>
-              <a:t>בסוף הבלוק של הלולאה, חוזרים לתנאי ובודקים אותו שוב</a:t>
-            </a:r>
-          </a:p>
-          <a:p>
-            <a:pPr lvl="2" algn="r" rtl="1"/>
-            <a:r>
-              <a:rPr lang="he-IL" i="1" dirty="0" smtClean="0"/>
+              <a:rPr lang="he-IL" dirty="0" smtClean="0"/>
               <a:t>נמשיך לבצע את הפקודות שבבלוק של הלולאה כל עוד ערך התנאי הוא </a:t>
             </a:r>
             <a:r>
-              <a:rPr lang="en-US" i="1" dirty="0" smtClean="0"/>
+              <a:rPr lang="en-US" dirty="0" smtClean="0"/>
               <a:t>true</a:t>
             </a:r>
-            <a:endParaRPr lang="he-IL" i="1" dirty="0" smtClean="0"/>
+            <a:endParaRPr lang="he-IL" dirty="0" smtClean="0"/>
           </a:p>
           <a:p>
             <a:pPr lvl="2" algn="r" rtl="1"/>
@@ -8672,15 +8641,7 @@
             <a:pPr lvl="1" algn="r" rtl="1"/>
             <a:r>
               <a:rPr lang="en-US" dirty="0" smtClean="0"/>
-              <a:t>x </a:t>
-            </a:r>
-            <a:r>
-              <a:rPr lang="en-US" dirty="0" smtClean="0"/>
-              <a:t>== </a:t>
-            </a:r>
-            <a:r>
-              <a:rPr lang="en-US" dirty="0" smtClean="0"/>
-              <a:t>y</a:t>
+              <a:t>x == y</a:t>
             </a:r>
             <a:r>
               <a:rPr lang="he-IL" dirty="0" smtClean="0"/>
@@ -8692,13 +8653,8 @@
             <a:pPr lvl="1" algn="r" rtl="1"/>
             <a:r>
               <a:rPr lang="en-US" dirty="0" smtClean="0"/>
-              <a:t>x  != </a:t>
-            </a:r>
-            <a:r>
-              <a:rPr lang="en-US" dirty="0" smtClean="0"/>
-              <a:t>y</a:t>
-            </a:r>
-            <a:endParaRPr lang="en-US" dirty="0" smtClean="0"/>
+              <a:t>x  != y</a:t>
+            </a:r>
           </a:p>
           <a:p>
             <a:pPr lvl="1" algn="r" rtl="1"/>
@@ -8711,11 +8667,7 @@
             <a:pPr lvl="1" algn="r" rtl="1"/>
             <a:r>
               <a:rPr lang="en-US" dirty="0" smtClean="0"/>
-              <a:t>x &gt;= </a:t>
-            </a:r>
-            <a:r>
-              <a:rPr lang="en-US" dirty="0" smtClean="0"/>
-              <a:t>y</a:t>
+              <a:t>x &gt;= y</a:t>
             </a:r>
             <a:endParaRPr lang="he-IL" dirty="0" smtClean="0"/>
           </a:p>
@@ -8736,6 +8688,11 @@
               <a:rPr lang="en-US" dirty="0" smtClean="0"/>
               <a:t>not</a:t>
             </a:r>
+            <a:r>
+              <a:rPr lang="he-IL" dirty="0" smtClean="0"/>
+              <a:t> - !</a:t>
+            </a:r>
+            <a:endParaRPr lang="en-US" dirty="0" smtClean="0"/>
           </a:p>
           <a:p>
             <a:pPr lvl="1" algn="r" rtl="1"/>
@@ -8743,6 +8700,15 @@
               <a:rPr lang="en-US" dirty="0" smtClean="0"/>
               <a:t>or</a:t>
             </a:r>
+            <a:r>
+              <a:rPr lang="he-IL" dirty="0"/>
+              <a:t> </a:t>
+            </a:r>
+            <a:r>
+              <a:rPr lang="he-IL" dirty="0" smtClean="0"/>
+              <a:t>- ||</a:t>
+            </a:r>
+            <a:endParaRPr lang="en-US" dirty="0" smtClean="0"/>
           </a:p>
           <a:p>
             <a:pPr lvl="1" algn="r" rtl="1"/>
@@ -8750,6 +8716,11 @@
               <a:rPr lang="en-US" dirty="0" smtClean="0"/>
               <a:t>and</a:t>
             </a:r>
+            <a:r>
+              <a:rPr lang="he-IL" smtClean="0"/>
+              <a:t> - &amp;&amp;</a:t>
+            </a:r>
+            <a:endParaRPr lang="en-US" dirty="0" smtClean="0"/>
           </a:p>
           <a:p>
             <a:pPr lvl="1" algn="r" rtl="1"/>

</xml_diff>